<commit_message>
feat: Add Document - PBA
</commit_message>
<xml_diff>
--- a/Rural Innivation - I/Mid-1/Mid-I Presentation PPT.pptx
+++ b/Rural Innivation - I/Mid-1/Mid-I Presentation PPT.pptx
@@ -275,7 +275,7 @@
       </p15:sldGuideLst>
     </p:ext>
     <p:ext uri="GoogleSlidesCustomDataVersion2">
-      <go:slidesCustomData xmlns:go="http://customooxmlschemas.google.com/" xmlns:ahyp="http://schemas.microsoft.com/office/drawing/2018/hyperlinkcolor" xmlns:p15="http://schemas.microsoft.com/office/powerpoint/2012/main" xmlns:p14="http://schemas.microsoft.com/office/powerpoint/2010/main" xmlns:com="http://schemas.openxmlformats.org/drawingml/2006/compatibility" xmlns:pvml="urn:schemas-microsoft-com:office:powerpoint" xmlns:v="urn:schemas-microsoft-com:vml" xmlns:o="urn:schemas-microsoft-com:office:office" xmlns:dgm="http://schemas.openxmlformats.org/drawingml/2006/diagram" xmlns:c="http://schemas.openxmlformats.org/drawingml/2006/chart" xmlns:mv="urn:schemas-microsoft-com:mac:vml" xmlns:mc="http://schemas.openxmlformats.org/markup-compatibility/2006" xmlns="" r:id="rId42" roundtripDataSignature="AMtx7mh03VDX9px0jFCiwzx1Hv1Yu+HUkw=="/>
+      <go:slidesCustomData xmlns="" xmlns:mc="http://schemas.openxmlformats.org/markup-compatibility/2006" xmlns:mv="urn:schemas-microsoft-com:mac:vml" xmlns:c="http://schemas.openxmlformats.org/drawingml/2006/chart" xmlns:dgm="http://schemas.openxmlformats.org/drawingml/2006/diagram" xmlns:o="urn:schemas-microsoft-com:office:office" xmlns:v="urn:schemas-microsoft-com:vml" xmlns:pvml="urn:schemas-microsoft-com:office:powerpoint" xmlns:com="http://schemas.openxmlformats.org/drawingml/2006/compatibility" xmlns:p14="http://schemas.microsoft.com/office/powerpoint/2010/main" xmlns:p15="http://schemas.microsoft.com/office/powerpoint/2012/main" xmlns:ahyp="http://schemas.microsoft.com/office/drawing/2018/hyperlinkcolor" xmlns:go="http://customooxmlschemas.google.com/" r:id="rId42" roundtripDataSignature="AMtx7mh03VDX9px0jFCiwzx1Hv1Yu+HUkw=="/>
     </p:ext>
   </p:extLst>
 </p:presentation>
@@ -375,7 +375,7 @@
           <a:p>
             <a:fld id="{4CE11179-36A0-49A9-9605-311CFC54F1DC}" type="datetimeFigureOut">
               <a:rPr lang="en-IN" smtClean="0"/>
-              <a:t>22-03-2025</a:t>
+              <a:t>24-03-2025</a:t>
             </a:fld>
             <a:endParaRPr lang="en-IN"/>
           </a:p>
@@ -15610,14 +15610,14 @@
           <p:nvPr>
             <p:extLst>
               <p:ext uri="{D42A27DB-BD31-4B8C-83A1-F6EECF244321}">
-                <p14:modId xmlns:p14="http://schemas.microsoft.com/office/powerpoint/2010/main" val="2354666390"/>
+                <p14:modId xmlns:p14="http://schemas.microsoft.com/office/powerpoint/2010/main" val="725886758"/>
               </p:ext>
             </p:extLst>
           </p:nvPr>
         </p:nvGraphicFramePr>
         <p:xfrm>
-          <a:off x="2032000" y="1403415"/>
-          <a:ext cx="8609205" cy="3429841"/>
+          <a:off x="1734531" y="1329911"/>
+          <a:ext cx="8616099" cy="4334165"/>
         </p:xfrm>
         <a:graphic>
           <a:graphicData uri="http://schemas.openxmlformats.org/drawingml/2006/table">
@@ -15626,21 +15626,21 @@
                 <a:tableStyleId>{17495F69-FD15-48A3-95F4-8DE335D87DF4}</a:tableStyleId>
               </a:tblPr>
               <a:tblGrid>
-                <a:gridCol w="2869735">
+                <a:gridCol w="2758664">
                   <a:extLst>
                     <a:ext uri="{9D8B030D-6E8A-4147-A177-3AD203B41FA5}">
                       <a16:colId xmlns:a16="http://schemas.microsoft.com/office/drawing/2014/main" val="804097060"/>
                     </a:ext>
                   </a:extLst>
                 </a:gridCol>
-                <a:gridCol w="2869735">
+                <a:gridCol w="4066343">
                   <a:extLst>
                     <a:ext uri="{9D8B030D-6E8A-4147-A177-3AD203B41FA5}">
                       <a16:colId xmlns:a16="http://schemas.microsoft.com/office/drawing/2014/main" val="3763731178"/>
                     </a:ext>
                   </a:extLst>
                 </a:gridCol>
-                <a:gridCol w="2869735">
+                <a:gridCol w="1791092">
                   <a:extLst>
                     <a:ext uri="{9D8B030D-6E8A-4147-A177-3AD203B41FA5}">
                       <a16:colId xmlns:a16="http://schemas.microsoft.com/office/drawing/2014/main" val="3156244685"/>
@@ -15648,7 +15648,7 @@
                   </a:extLst>
                 </a:gridCol>
               </a:tblGrid>
-              <a:tr h="577300">
+              <a:tr h="456997">
                 <a:tc>
                   <a:txBody>
                     <a:bodyPr/>
@@ -15718,7 +15718,7 @@
                   </a:ext>
                 </a:extLst>
               </a:tr>
-              <a:tr h="781053">
+              <a:tr h="618289">
                 <a:tc>
                   <a:txBody>
                     <a:bodyPr/>
@@ -15740,12 +15740,13 @@
                     <a:bodyPr/>
                     <a:lstStyle/>
                     <a:p>
+                      <a:pPr algn="ctr"/>
                       <a:r>
-                        <a:rPr lang="en-IN" sz="2000">
+                        <a:rPr lang="en-IN" sz="2000" dirty="0">
                           <a:latin typeface="Times New Roman" panose="02020603050405020304" pitchFamily="18" charset="0"/>
                           <a:cs typeface="Times New Roman" panose="02020603050405020304" pitchFamily="18" charset="0"/>
                         </a:rPr>
-                        <a:t>Accuracy &amp; relevance of materials</a:t>
+                        <a:t>-</a:t>
                       </a:r>
                     </a:p>
                   </a:txBody>
@@ -15758,12 +15759,16 @@
                     <a:p>
                       <a:pPr algn="ctr"/>
                       <a:r>
-                        <a:rPr lang="en-IN" sz="2000">
+                        <a:rPr lang="en-US" sz="2000" dirty="0">
                           <a:latin typeface="Times New Roman" panose="02020603050405020304" pitchFamily="18" charset="0"/>
                           <a:cs typeface="Times New Roman" panose="02020603050405020304" pitchFamily="18" charset="0"/>
                         </a:rPr>
-                        <a:t>40%</a:t>
+                        <a:t>Review</a:t>
                       </a:r>
+                      <a:endParaRPr lang="en-IN" sz="2000" dirty="0">
+                        <a:latin typeface="Times New Roman" panose="02020603050405020304" pitchFamily="18" charset="0"/>
+                        <a:cs typeface="Times New Roman" panose="02020603050405020304" pitchFamily="18" charset="0"/>
+                      </a:endParaRPr>
                     </a:p>
                   </a:txBody>
                   <a:tcPr anchor="ctr"/>
@@ -15774,7 +15779,7 @@
                   </a:ext>
                 </a:extLst>
               </a:tr>
-              <a:tr h="509382">
+              <a:tr h="349468">
                 <a:tc>
                   <a:txBody>
                     <a:bodyPr/>
@@ -15796,12 +15801,13 @@
                     <a:bodyPr/>
                     <a:lstStyle/>
                     <a:p>
+                      <a:pPr algn="ctr"/>
                       <a:r>
                         <a:rPr lang="en-IN" sz="2000" dirty="0">
                           <a:latin typeface="Times New Roman" panose="02020603050405020304" pitchFamily="18" charset="0"/>
                           <a:cs typeface="Times New Roman" panose="02020603050405020304" pitchFamily="18" charset="0"/>
                         </a:rPr>
-                        <a:t>Active users &amp; retention</a:t>
+                        <a:t>-</a:t>
                       </a:r>
                     </a:p>
                   </a:txBody>
@@ -15814,12 +15820,16 @@
                     <a:p>
                       <a:pPr algn="ctr"/>
                       <a:r>
-                        <a:rPr lang="en-IN" sz="2000" dirty="0">
+                        <a:rPr lang="en-US" sz="2000" dirty="0">
                           <a:latin typeface="Times New Roman" panose="02020603050405020304" pitchFamily="18" charset="0"/>
                           <a:cs typeface="Times New Roman" panose="02020603050405020304" pitchFamily="18" charset="0"/>
                         </a:rPr>
-                        <a:t>30%</a:t>
+                        <a:t>Review</a:t>
                       </a:r>
+                      <a:endParaRPr lang="en-IN" sz="2000" dirty="0">
+                        <a:latin typeface="Times New Roman" panose="02020603050405020304" pitchFamily="18" charset="0"/>
+                        <a:cs typeface="Times New Roman" panose="02020603050405020304" pitchFamily="18" charset="0"/>
+                      </a:endParaRPr>
                     </a:p>
                   </a:txBody>
                   <a:tcPr anchor="ctr"/>
@@ -15830,7 +15840,7 @@
                   </a:ext>
                 </a:extLst>
               </a:tr>
-              <a:tr h="781053">
+              <a:tr h="327840">
                 <a:tc>
                   <a:txBody>
                     <a:bodyPr/>
@@ -15852,12 +15862,13 @@
                     <a:bodyPr/>
                     <a:lstStyle/>
                     <a:p>
+                      <a:pPr algn="ctr"/>
                       <a:r>
                         <a:rPr lang="en-IN" sz="2000" dirty="0">
                           <a:latin typeface="Times New Roman" panose="02020603050405020304" pitchFamily="18" charset="0"/>
                           <a:cs typeface="Times New Roman" panose="02020603050405020304" pitchFamily="18" charset="0"/>
                         </a:rPr>
-                        <a:t>Improvement in aspirants' scores</a:t>
+                        <a:t>-</a:t>
                       </a:r>
                     </a:p>
                   </a:txBody>
@@ -15870,12 +15881,16 @@
                     <a:p>
                       <a:pPr algn="ctr"/>
                       <a:r>
-                        <a:rPr lang="en-IN" sz="2000" dirty="0">
+                        <a:rPr lang="en-US" sz="2000" dirty="0">
                           <a:latin typeface="Times New Roman" panose="02020603050405020304" pitchFamily="18" charset="0"/>
                           <a:cs typeface="Times New Roman" panose="02020603050405020304" pitchFamily="18" charset="0"/>
                         </a:rPr>
-                        <a:t>20%</a:t>
+                        <a:t>Review</a:t>
                       </a:r>
+                      <a:endParaRPr lang="en-IN" sz="2000" dirty="0">
+                        <a:latin typeface="Times New Roman" panose="02020603050405020304" pitchFamily="18" charset="0"/>
+                        <a:cs typeface="Times New Roman" panose="02020603050405020304" pitchFamily="18" charset="0"/>
+                      </a:endParaRPr>
                     </a:p>
                   </a:txBody>
                   <a:tcPr anchor="ctr"/>
@@ -15886,7 +15901,7 @@
                   </a:ext>
                 </a:extLst>
               </a:tr>
-              <a:tr h="781053">
+              <a:tr h="372570">
                 <a:tc>
                   <a:txBody>
                     <a:bodyPr/>
@@ -15908,13 +15923,18 @@
                     <a:bodyPr/>
                     <a:lstStyle/>
                     <a:p>
+                      <a:pPr algn="ctr"/>
                       <a:r>
-                        <a:rPr lang="en-IN" sz="2000" dirty="0">
+                        <a:rPr lang="en-US" sz="2000" dirty="0">
                           <a:latin typeface="Times New Roman" panose="02020603050405020304" pitchFamily="18" charset="0"/>
                           <a:cs typeface="Times New Roman" panose="02020603050405020304" pitchFamily="18" charset="0"/>
                         </a:rPr>
-                        <a:t>Topic summarization accuracy</a:t>
+                        <a:t>90</a:t>
                       </a:r>
+                      <a:endParaRPr lang="en-IN" sz="2000" dirty="0">
+                        <a:latin typeface="Times New Roman" panose="02020603050405020304" pitchFamily="18" charset="0"/>
+                        <a:cs typeface="Times New Roman" panose="02020603050405020304" pitchFamily="18" charset="0"/>
+                      </a:endParaRPr>
                     </a:p>
                   </a:txBody>
                   <a:tcPr anchor="ctr"/>
@@ -15930,7 +15950,7 @@
                           <a:latin typeface="Times New Roman" panose="02020603050405020304" pitchFamily="18" charset="0"/>
                           <a:cs typeface="Times New Roman" panose="02020603050405020304" pitchFamily="18" charset="0"/>
                         </a:rPr>
-                        <a:t>10%</a:t>
+                        <a:t>%</a:t>
                       </a:r>
                     </a:p>
                   </a:txBody>
@@ -15939,6 +15959,259 @@
                 <a:extLst>
                   <a:ext uri="{0D108BD9-81ED-4DB2-BD59-A6C34878D82A}">
                     <a16:rowId xmlns:a16="http://schemas.microsoft.com/office/drawing/2014/main" val="1512108891"/>
+                  </a:ext>
+                </a:extLst>
+              </a:tr>
+              <a:tr h="322586">
+                <a:tc>
+                  <a:txBody>
+                    <a:bodyPr/>
+                    <a:lstStyle/>
+                    <a:p>
+                      <a:r>
+                        <a:rPr lang="en-IN" sz="1800" dirty="0">
+                          <a:latin typeface="Times New Roman" panose="02020603050405020304" pitchFamily="18" charset="0"/>
+                          <a:cs typeface="Times New Roman" panose="02020603050405020304" pitchFamily="18" charset="0"/>
+                        </a:rPr>
+                        <a:t>Required Internet </a:t>
+                      </a:r>
+                    </a:p>
+                  </a:txBody>
+                  <a:tcPr anchor="ctr"/>
+                </a:tc>
+                <a:tc>
+                  <a:txBody>
+                    <a:bodyPr/>
+                    <a:lstStyle/>
+                    <a:p>
+                      <a:pPr algn="ctr"/>
+                      <a:r>
+                        <a:rPr lang="en-US" sz="1800" dirty="0">
+                          <a:latin typeface="Times New Roman" panose="02020603050405020304" pitchFamily="18" charset="0"/>
+                          <a:cs typeface="Times New Roman" panose="02020603050405020304" pitchFamily="18" charset="0"/>
+                        </a:rPr>
+                        <a:t>900</a:t>
+                      </a:r>
+                    </a:p>
+                  </a:txBody>
+                  <a:tcPr anchor="ctr"/>
+                </a:tc>
+                <a:tc>
+                  <a:txBody>
+                    <a:bodyPr/>
+                    <a:lstStyle/>
+                    <a:p>
+                      <a:pPr algn="ctr"/>
+                      <a:r>
+                        <a:rPr lang="en-US" sz="1800" dirty="0">
+                          <a:latin typeface="Times New Roman" panose="02020603050405020304" pitchFamily="18" charset="0"/>
+                          <a:cs typeface="Times New Roman" panose="02020603050405020304" pitchFamily="18" charset="0"/>
+                        </a:rPr>
+                        <a:t>MB</a:t>
+                      </a:r>
+                      <a:endParaRPr lang="en-IN" sz="1800" dirty="0">
+                        <a:latin typeface="Times New Roman" panose="02020603050405020304" pitchFamily="18" charset="0"/>
+                        <a:cs typeface="Times New Roman" panose="02020603050405020304" pitchFamily="18" charset="0"/>
+                      </a:endParaRPr>
+                    </a:p>
+                  </a:txBody>
+                  <a:tcPr anchor="ctr"/>
+                </a:tc>
+                <a:extLst>
+                  <a:ext uri="{0D108BD9-81ED-4DB2-BD59-A6C34878D82A}">
+                    <a16:rowId xmlns:a16="http://schemas.microsoft.com/office/drawing/2014/main" val="917855364"/>
+                  </a:ext>
+                </a:extLst>
+              </a:tr>
+              <a:tr h="410809">
+                <a:tc>
+                  <a:txBody>
+                    <a:bodyPr/>
+                    <a:lstStyle/>
+                    <a:p>
+                      <a:endParaRPr lang="en-IN" sz="2000" dirty="0">
+                        <a:latin typeface="Times New Roman" panose="02020603050405020304" pitchFamily="18" charset="0"/>
+                        <a:cs typeface="Times New Roman" panose="02020603050405020304" pitchFamily="18" charset="0"/>
+                      </a:endParaRPr>
+                    </a:p>
+                  </a:txBody>
+                  <a:tcPr anchor="ctr"/>
+                </a:tc>
+                <a:tc>
+                  <a:txBody>
+                    <a:bodyPr/>
+                    <a:lstStyle/>
+                    <a:p>
+                      <a:pPr algn="ctr"/>
+                      <a:endParaRPr lang="en-IN" sz="2000" dirty="0">
+                        <a:latin typeface="Times New Roman" panose="02020603050405020304" pitchFamily="18" charset="0"/>
+                        <a:cs typeface="Times New Roman" panose="02020603050405020304" pitchFamily="18" charset="0"/>
+                      </a:endParaRPr>
+                    </a:p>
+                  </a:txBody>
+                  <a:tcPr anchor="ctr"/>
+                </a:tc>
+                <a:tc>
+                  <a:txBody>
+                    <a:bodyPr/>
+                    <a:lstStyle/>
+                    <a:p>
+                      <a:pPr algn="ctr"/>
+                      <a:endParaRPr lang="en-IN" sz="2000" dirty="0">
+                        <a:latin typeface="Times New Roman" panose="02020603050405020304" pitchFamily="18" charset="0"/>
+                        <a:cs typeface="Times New Roman" panose="02020603050405020304" pitchFamily="18" charset="0"/>
+                      </a:endParaRPr>
+                    </a:p>
+                  </a:txBody>
+                  <a:tcPr anchor="ctr"/>
+                </a:tc>
+                <a:extLst>
+                  <a:ext uri="{0D108BD9-81ED-4DB2-BD59-A6C34878D82A}">
+                    <a16:rowId xmlns:a16="http://schemas.microsoft.com/office/drawing/2014/main" val="3082380439"/>
+                  </a:ext>
+                </a:extLst>
+              </a:tr>
+              <a:tr h="410809">
+                <a:tc>
+                  <a:txBody>
+                    <a:bodyPr/>
+                    <a:lstStyle/>
+                    <a:p>
+                      <a:endParaRPr lang="en-IN" sz="2000" dirty="0">
+                        <a:latin typeface="Times New Roman" panose="02020603050405020304" pitchFamily="18" charset="0"/>
+                        <a:cs typeface="Times New Roman" panose="02020603050405020304" pitchFamily="18" charset="0"/>
+                      </a:endParaRPr>
+                    </a:p>
+                  </a:txBody>
+                  <a:tcPr anchor="ctr"/>
+                </a:tc>
+                <a:tc>
+                  <a:txBody>
+                    <a:bodyPr/>
+                    <a:lstStyle/>
+                    <a:p>
+                      <a:pPr algn="ctr"/>
+                      <a:endParaRPr lang="en-IN" sz="2000" dirty="0">
+                        <a:latin typeface="Times New Roman" panose="02020603050405020304" pitchFamily="18" charset="0"/>
+                        <a:cs typeface="Times New Roman" panose="02020603050405020304" pitchFamily="18" charset="0"/>
+                      </a:endParaRPr>
+                    </a:p>
+                  </a:txBody>
+                  <a:tcPr anchor="ctr"/>
+                </a:tc>
+                <a:tc>
+                  <a:txBody>
+                    <a:bodyPr/>
+                    <a:lstStyle/>
+                    <a:p>
+                      <a:pPr algn="ctr"/>
+                      <a:endParaRPr lang="en-IN" sz="2000" dirty="0">
+                        <a:latin typeface="Times New Roman" panose="02020603050405020304" pitchFamily="18" charset="0"/>
+                        <a:cs typeface="Times New Roman" panose="02020603050405020304" pitchFamily="18" charset="0"/>
+                      </a:endParaRPr>
+                    </a:p>
+                  </a:txBody>
+                  <a:tcPr anchor="ctr"/>
+                </a:tc>
+                <a:extLst>
+                  <a:ext uri="{0D108BD9-81ED-4DB2-BD59-A6C34878D82A}">
+                    <a16:rowId xmlns:a16="http://schemas.microsoft.com/office/drawing/2014/main" val="3911781430"/>
+                  </a:ext>
+                </a:extLst>
+              </a:tr>
+              <a:tr h="410809">
+                <a:tc>
+                  <a:txBody>
+                    <a:bodyPr/>
+                    <a:lstStyle/>
+                    <a:p>
+                      <a:endParaRPr lang="en-IN" sz="2000" dirty="0">
+                        <a:latin typeface="Times New Roman" panose="02020603050405020304" pitchFamily="18" charset="0"/>
+                        <a:cs typeface="Times New Roman" panose="02020603050405020304" pitchFamily="18" charset="0"/>
+                      </a:endParaRPr>
+                    </a:p>
+                  </a:txBody>
+                  <a:tcPr anchor="ctr"/>
+                </a:tc>
+                <a:tc>
+                  <a:txBody>
+                    <a:bodyPr/>
+                    <a:lstStyle/>
+                    <a:p>
+                      <a:pPr algn="ctr"/>
+                      <a:endParaRPr lang="en-IN" sz="2000" dirty="0">
+                        <a:latin typeface="Times New Roman" panose="02020603050405020304" pitchFamily="18" charset="0"/>
+                        <a:cs typeface="Times New Roman" panose="02020603050405020304" pitchFamily="18" charset="0"/>
+                      </a:endParaRPr>
+                    </a:p>
+                  </a:txBody>
+                  <a:tcPr anchor="ctr"/>
+                </a:tc>
+                <a:tc>
+                  <a:txBody>
+                    <a:bodyPr/>
+                    <a:lstStyle/>
+                    <a:p>
+                      <a:pPr algn="ctr"/>
+                      <a:endParaRPr lang="en-IN" sz="2000" dirty="0">
+                        <a:latin typeface="Times New Roman" panose="02020603050405020304" pitchFamily="18" charset="0"/>
+                        <a:cs typeface="Times New Roman" panose="02020603050405020304" pitchFamily="18" charset="0"/>
+                      </a:endParaRPr>
+                    </a:p>
+                  </a:txBody>
+                  <a:tcPr anchor="ctr"/>
+                </a:tc>
+                <a:extLst>
+                  <a:ext uri="{0D108BD9-81ED-4DB2-BD59-A6C34878D82A}">
+                    <a16:rowId xmlns:a16="http://schemas.microsoft.com/office/drawing/2014/main" val="2768014715"/>
+                  </a:ext>
+                </a:extLst>
+              </a:tr>
+              <a:tr h="410809">
+                <a:tc>
+                  <a:txBody>
+                    <a:bodyPr/>
+                    <a:lstStyle/>
+                    <a:p>
+                      <a:endParaRPr lang="en-IN" sz="2000" dirty="0">
+                        <a:latin typeface="Times New Roman" panose="02020603050405020304" pitchFamily="18" charset="0"/>
+                        <a:cs typeface="Times New Roman" panose="02020603050405020304" pitchFamily="18" charset="0"/>
+                      </a:endParaRPr>
+                    </a:p>
+                  </a:txBody>
+                  <a:tcPr anchor="ctr"/>
+                </a:tc>
+                <a:tc>
+                  <a:txBody>
+                    <a:bodyPr/>
+                    <a:lstStyle/>
+                    <a:p>
+                      <a:pPr algn="ctr"/>
+                      <a:endParaRPr lang="en-IN" sz="2000" dirty="0">
+                        <a:latin typeface="Times New Roman" panose="02020603050405020304" pitchFamily="18" charset="0"/>
+                        <a:cs typeface="Times New Roman" panose="02020603050405020304" pitchFamily="18" charset="0"/>
+                      </a:endParaRPr>
+                    </a:p>
+                  </a:txBody>
+                  <a:tcPr anchor="ctr"/>
+                </a:tc>
+                <a:tc>
+                  <a:txBody>
+                    <a:bodyPr/>
+                    <a:lstStyle/>
+                    <a:p>
+                      <a:pPr algn="ctr"/>
+                      <a:endParaRPr lang="en-IN" sz="2000" dirty="0">
+                        <a:latin typeface="Times New Roman" panose="02020603050405020304" pitchFamily="18" charset="0"/>
+                        <a:cs typeface="Times New Roman" panose="02020603050405020304" pitchFamily="18" charset="0"/>
+                      </a:endParaRPr>
+                    </a:p>
+                  </a:txBody>
+                  <a:tcPr anchor="ctr"/>
+                </a:tc>
+                <a:extLst>
+                  <a:ext uri="{0D108BD9-81ED-4DB2-BD59-A6C34878D82A}">
+                    <a16:rowId xmlns:a16="http://schemas.microsoft.com/office/drawing/2014/main" val="3265814627"/>
                   </a:ext>
                 </a:extLst>
               </a:tr>

</xml_diff>